<commit_message>
added more notes regarding policy and value iteration
</commit_message>
<xml_diff>
--- a/RL/theoretical/Equations/pictures/Untitled PPTX 演示文稿.pptx
+++ b/RL/theoretical/Equations/pictures/Untitled PPTX 演示文稿.pptx
@@ -1,9 +1,12 @@
 
 <file path=ppt/presentation.xml><?xml version="1.0" encoding="utf-8"?>
-<p:presentation xmlns:a="http://schemas.openxmlformats.org/drawingml/2006/main" xmlns:r="http://schemas.openxmlformats.org/officeDocument/2006/relationships" xmlns:p="http://schemas.openxmlformats.org/presentationml/2006/main" saveSubsetFonts="1">
+<p:presentation xmlns:a="http://schemas.openxmlformats.org/drawingml/2006/main" xmlns:r="http://schemas.openxmlformats.org/officeDocument/2006/relationships" xmlns:p="http://schemas.openxmlformats.org/presentationml/2006/main">
   <p:sldMasterIdLst>
     <p:sldMasterId id="2147483648" r:id="rId1"/>
   </p:sldMasterIdLst>
+  <p:sldIdLst>
+    <p:sldId id="256" r:id="rId3"/>
+  </p:sldIdLst>
   <p:sldSz cx="12192000" cy="6858000"/>
   <p:notesSz cx="6858000" cy="9144000"/>
   <p:defaultTextStyle>
@@ -235,7 +238,6 @@
           <a:p>
             <a:fld id="{D997B5FA-0921-464F-AAE1-844C04324D75}" type="datetimeFigureOut">
               <a:rPr lang="zh-CN" altLang="en-US" smtClean="0"/>
-              <a:t>2015/5/5</a:t>
             </a:fld>
             <a:endParaRPr lang="zh-CN" altLang="en-US"/>
           </a:p>
@@ -277,18 +279,12 @@
           <a:p>
             <a:fld id="{565CE74E-AB26-4998-AD42-012C4C1AD076}" type="slidenum">
               <a:rPr lang="zh-CN" altLang="en-US" smtClean="0"/>
-              <a:t>‹#›</a:t>
             </a:fld>
             <a:endParaRPr lang="zh-CN" altLang="en-US"/>
           </a:p>
         </p:txBody>
       </p:sp>
     </p:spTree>
-    <p:extLst>
-      <p:ext uri="{BB962C8B-B14F-4D97-AF65-F5344CB8AC3E}">
-        <p14:creationId xmlns:p14="http://schemas.microsoft.com/office/powerpoint/2010/main" val="3051827620"/>
-      </p:ext>
-    </p:extLst>
   </p:cSld>
   <p:clrMapOvr>
     <a:masterClrMapping/>
@@ -356,6 +352,7 @@
               <a:rPr lang="zh-CN" altLang="en-US" smtClean="0"/>
               <a:t>单击此处编辑母版文本样式</a:t>
             </a:r>
+            <a:endParaRPr lang="zh-CN" altLang="en-US" smtClean="0"/>
           </a:p>
           <a:p>
             <a:pPr lvl="1"/>
@@ -363,6 +360,7 @@
               <a:rPr lang="zh-CN" altLang="en-US" smtClean="0"/>
               <a:t>第二级</a:t>
             </a:r>
+            <a:endParaRPr lang="zh-CN" altLang="en-US" smtClean="0"/>
           </a:p>
           <a:p>
             <a:pPr lvl="2"/>
@@ -370,6 +368,7 @@
               <a:rPr lang="zh-CN" altLang="en-US" smtClean="0"/>
               <a:t>第三级</a:t>
             </a:r>
+            <a:endParaRPr lang="zh-CN" altLang="en-US" smtClean="0"/>
           </a:p>
           <a:p>
             <a:pPr lvl="3"/>
@@ -377,6 +376,7 @@
               <a:rPr lang="zh-CN" altLang="en-US" smtClean="0"/>
               <a:t>第四级</a:t>
             </a:r>
+            <a:endParaRPr lang="zh-CN" altLang="en-US" smtClean="0"/>
           </a:p>
           <a:p>
             <a:pPr lvl="4"/>
@@ -405,7 +405,6 @@
           <a:p>
             <a:fld id="{D997B5FA-0921-464F-AAE1-844C04324D75}" type="datetimeFigureOut">
               <a:rPr lang="zh-CN" altLang="en-US" smtClean="0"/>
-              <a:t>2015/5/5</a:t>
             </a:fld>
             <a:endParaRPr lang="zh-CN" altLang="en-US"/>
           </a:p>
@@ -447,18 +446,12 @@
           <a:p>
             <a:fld id="{565CE74E-AB26-4998-AD42-012C4C1AD076}" type="slidenum">
               <a:rPr lang="zh-CN" altLang="en-US" smtClean="0"/>
-              <a:t>‹#›</a:t>
             </a:fld>
             <a:endParaRPr lang="zh-CN" altLang="en-US"/>
           </a:p>
         </p:txBody>
       </p:sp>
     </p:spTree>
-    <p:extLst>
-      <p:ext uri="{BB962C8B-B14F-4D97-AF65-F5344CB8AC3E}">
-        <p14:creationId xmlns:p14="http://schemas.microsoft.com/office/powerpoint/2010/main" val="3188717747"/>
-      </p:ext>
-    </p:extLst>
   </p:cSld>
   <p:clrMapOvr>
     <a:masterClrMapping/>
@@ -536,6 +529,7 @@
               <a:rPr lang="zh-CN" altLang="en-US" smtClean="0"/>
               <a:t>单击此处编辑母版文本样式</a:t>
             </a:r>
+            <a:endParaRPr lang="zh-CN" altLang="en-US" smtClean="0"/>
           </a:p>
           <a:p>
             <a:pPr lvl="1"/>
@@ -543,6 +537,7 @@
               <a:rPr lang="zh-CN" altLang="en-US" smtClean="0"/>
               <a:t>第二级</a:t>
             </a:r>
+            <a:endParaRPr lang="zh-CN" altLang="en-US" smtClean="0"/>
           </a:p>
           <a:p>
             <a:pPr lvl="2"/>
@@ -550,6 +545,7 @@
               <a:rPr lang="zh-CN" altLang="en-US" smtClean="0"/>
               <a:t>第三级</a:t>
             </a:r>
+            <a:endParaRPr lang="zh-CN" altLang="en-US" smtClean="0"/>
           </a:p>
           <a:p>
             <a:pPr lvl="3"/>
@@ -557,6 +553,7 @@
               <a:rPr lang="zh-CN" altLang="en-US" smtClean="0"/>
               <a:t>第四级</a:t>
             </a:r>
+            <a:endParaRPr lang="zh-CN" altLang="en-US" smtClean="0"/>
           </a:p>
           <a:p>
             <a:pPr lvl="4"/>
@@ -585,7 +582,6 @@
           <a:p>
             <a:fld id="{D997B5FA-0921-464F-AAE1-844C04324D75}" type="datetimeFigureOut">
               <a:rPr lang="zh-CN" altLang="en-US" smtClean="0"/>
-              <a:t>2015/5/5</a:t>
             </a:fld>
             <a:endParaRPr lang="zh-CN" altLang="en-US"/>
           </a:p>
@@ -627,18 +623,12 @@
           <a:p>
             <a:fld id="{565CE74E-AB26-4998-AD42-012C4C1AD076}" type="slidenum">
               <a:rPr lang="zh-CN" altLang="en-US" smtClean="0"/>
-              <a:t>‹#›</a:t>
             </a:fld>
             <a:endParaRPr lang="zh-CN" altLang="en-US"/>
           </a:p>
         </p:txBody>
       </p:sp>
     </p:spTree>
-    <p:extLst>
-      <p:ext uri="{BB962C8B-B14F-4D97-AF65-F5344CB8AC3E}">
-        <p14:creationId xmlns:p14="http://schemas.microsoft.com/office/powerpoint/2010/main" val="4025501431"/>
-      </p:ext>
-    </p:extLst>
   </p:cSld>
   <p:clrMapOvr>
     <a:masterClrMapping/>
@@ -706,6 +696,7 @@
               <a:rPr lang="zh-CN" altLang="en-US" smtClean="0"/>
               <a:t>单击此处编辑母版文本样式</a:t>
             </a:r>
+            <a:endParaRPr lang="zh-CN" altLang="en-US" smtClean="0"/>
           </a:p>
           <a:p>
             <a:pPr lvl="1"/>
@@ -713,6 +704,7 @@
               <a:rPr lang="zh-CN" altLang="en-US" smtClean="0"/>
               <a:t>第二级</a:t>
             </a:r>
+            <a:endParaRPr lang="zh-CN" altLang="en-US" smtClean="0"/>
           </a:p>
           <a:p>
             <a:pPr lvl="2"/>
@@ -720,6 +712,7 @@
               <a:rPr lang="zh-CN" altLang="en-US" smtClean="0"/>
               <a:t>第三级</a:t>
             </a:r>
+            <a:endParaRPr lang="zh-CN" altLang="en-US" smtClean="0"/>
           </a:p>
           <a:p>
             <a:pPr lvl="3"/>
@@ -727,6 +720,7 @@
               <a:rPr lang="zh-CN" altLang="en-US" smtClean="0"/>
               <a:t>第四级</a:t>
             </a:r>
+            <a:endParaRPr lang="zh-CN" altLang="en-US" smtClean="0"/>
           </a:p>
           <a:p>
             <a:pPr lvl="4"/>
@@ -755,7 +749,6 @@
           <a:p>
             <a:fld id="{D997B5FA-0921-464F-AAE1-844C04324D75}" type="datetimeFigureOut">
               <a:rPr lang="zh-CN" altLang="en-US" smtClean="0"/>
-              <a:t>2015/5/5</a:t>
             </a:fld>
             <a:endParaRPr lang="zh-CN" altLang="en-US"/>
           </a:p>
@@ -797,18 +790,12 @@
           <a:p>
             <a:fld id="{565CE74E-AB26-4998-AD42-012C4C1AD076}" type="slidenum">
               <a:rPr lang="zh-CN" altLang="en-US" smtClean="0"/>
-              <a:t>‹#›</a:t>
             </a:fld>
             <a:endParaRPr lang="zh-CN" altLang="en-US"/>
           </a:p>
         </p:txBody>
       </p:sp>
     </p:spTree>
-    <p:extLst>
-      <p:ext uri="{BB962C8B-B14F-4D97-AF65-F5344CB8AC3E}">
-        <p14:creationId xmlns:p14="http://schemas.microsoft.com/office/powerpoint/2010/main" val="598653943"/>
-      </p:ext>
-    </p:extLst>
   </p:cSld>
   <p:clrMapOvr>
     <a:masterClrMapping/>
@@ -981,6 +968,7 @@
               <a:rPr lang="zh-CN" altLang="en-US" smtClean="0"/>
               <a:t>单击此处编辑母版文本样式</a:t>
             </a:r>
+            <a:endParaRPr lang="zh-CN" altLang="en-US" smtClean="0"/>
           </a:p>
         </p:txBody>
       </p:sp>
@@ -1001,7 +989,6 @@
           <a:p>
             <a:fld id="{D997B5FA-0921-464F-AAE1-844C04324D75}" type="datetimeFigureOut">
               <a:rPr lang="zh-CN" altLang="en-US" smtClean="0"/>
-              <a:t>2015/5/5</a:t>
             </a:fld>
             <a:endParaRPr lang="zh-CN" altLang="en-US"/>
           </a:p>
@@ -1043,18 +1030,12 @@
           <a:p>
             <a:fld id="{565CE74E-AB26-4998-AD42-012C4C1AD076}" type="slidenum">
               <a:rPr lang="zh-CN" altLang="en-US" smtClean="0"/>
-              <a:t>‹#›</a:t>
             </a:fld>
             <a:endParaRPr lang="zh-CN" altLang="en-US"/>
           </a:p>
         </p:txBody>
       </p:sp>
     </p:spTree>
-    <p:extLst>
-      <p:ext uri="{BB962C8B-B14F-4D97-AF65-F5344CB8AC3E}">
-        <p14:creationId xmlns:p14="http://schemas.microsoft.com/office/powerpoint/2010/main" val="1612184157"/>
-      </p:ext>
-    </p:extLst>
   </p:cSld>
   <p:clrMapOvr>
     <a:masterClrMapping/>
@@ -1127,6 +1108,7 @@
               <a:rPr lang="zh-CN" altLang="en-US" smtClean="0"/>
               <a:t>单击此处编辑母版文本样式</a:t>
             </a:r>
+            <a:endParaRPr lang="zh-CN" altLang="en-US" smtClean="0"/>
           </a:p>
           <a:p>
             <a:pPr lvl="1"/>
@@ -1134,6 +1116,7 @@
               <a:rPr lang="zh-CN" altLang="en-US" smtClean="0"/>
               <a:t>第二级</a:t>
             </a:r>
+            <a:endParaRPr lang="zh-CN" altLang="en-US" smtClean="0"/>
           </a:p>
           <a:p>
             <a:pPr lvl="2"/>
@@ -1141,6 +1124,7 @@
               <a:rPr lang="zh-CN" altLang="en-US" smtClean="0"/>
               <a:t>第三级</a:t>
             </a:r>
+            <a:endParaRPr lang="zh-CN" altLang="en-US" smtClean="0"/>
           </a:p>
           <a:p>
             <a:pPr lvl="3"/>
@@ -1148,6 +1132,7 @@
               <a:rPr lang="zh-CN" altLang="en-US" smtClean="0"/>
               <a:t>第四级</a:t>
             </a:r>
+            <a:endParaRPr lang="zh-CN" altLang="en-US" smtClean="0"/>
           </a:p>
           <a:p>
             <a:pPr lvl="4"/>
@@ -1184,6 +1169,7 @@
               <a:rPr lang="zh-CN" altLang="en-US" smtClean="0"/>
               <a:t>单击此处编辑母版文本样式</a:t>
             </a:r>
+            <a:endParaRPr lang="zh-CN" altLang="en-US" smtClean="0"/>
           </a:p>
           <a:p>
             <a:pPr lvl="1"/>
@@ -1191,6 +1177,7 @@
               <a:rPr lang="zh-CN" altLang="en-US" smtClean="0"/>
               <a:t>第二级</a:t>
             </a:r>
+            <a:endParaRPr lang="zh-CN" altLang="en-US" smtClean="0"/>
           </a:p>
           <a:p>
             <a:pPr lvl="2"/>
@@ -1198,6 +1185,7 @@
               <a:rPr lang="zh-CN" altLang="en-US" smtClean="0"/>
               <a:t>第三级</a:t>
             </a:r>
+            <a:endParaRPr lang="zh-CN" altLang="en-US" smtClean="0"/>
           </a:p>
           <a:p>
             <a:pPr lvl="3"/>
@@ -1205,6 +1193,7 @@
               <a:rPr lang="zh-CN" altLang="en-US" smtClean="0"/>
               <a:t>第四级</a:t>
             </a:r>
+            <a:endParaRPr lang="zh-CN" altLang="en-US" smtClean="0"/>
           </a:p>
           <a:p>
             <a:pPr lvl="4"/>
@@ -1233,7 +1222,6 @@
           <a:p>
             <a:fld id="{D997B5FA-0921-464F-AAE1-844C04324D75}" type="datetimeFigureOut">
               <a:rPr lang="zh-CN" altLang="en-US" smtClean="0"/>
-              <a:t>2015/5/5</a:t>
             </a:fld>
             <a:endParaRPr lang="zh-CN" altLang="en-US"/>
           </a:p>
@@ -1275,18 +1263,12 @@
           <a:p>
             <a:fld id="{565CE74E-AB26-4998-AD42-012C4C1AD076}" type="slidenum">
               <a:rPr lang="zh-CN" altLang="en-US" smtClean="0"/>
-              <a:t>‹#›</a:t>
             </a:fld>
             <a:endParaRPr lang="zh-CN" altLang="en-US"/>
           </a:p>
         </p:txBody>
       </p:sp>
     </p:spTree>
-    <p:extLst>
-      <p:ext uri="{BB962C8B-B14F-4D97-AF65-F5344CB8AC3E}">
-        <p14:creationId xmlns:p14="http://schemas.microsoft.com/office/powerpoint/2010/main" val="2905825717"/>
-      </p:ext>
-    </p:extLst>
   </p:cSld>
   <p:clrMapOvr>
     <a:masterClrMapping/>
@@ -1401,6 +1383,7 @@
               <a:rPr lang="zh-CN" altLang="en-US" smtClean="0"/>
               <a:t>单击此处编辑母版文本样式</a:t>
             </a:r>
+            <a:endParaRPr lang="zh-CN" altLang="en-US" smtClean="0"/>
           </a:p>
         </p:txBody>
       </p:sp>
@@ -1429,6 +1412,7 @@
               <a:rPr lang="zh-CN" altLang="en-US" smtClean="0"/>
               <a:t>单击此处编辑母版文本样式</a:t>
             </a:r>
+            <a:endParaRPr lang="zh-CN" altLang="en-US" smtClean="0"/>
           </a:p>
           <a:p>
             <a:pPr lvl="1"/>
@@ -1436,6 +1420,7 @@
               <a:rPr lang="zh-CN" altLang="en-US" smtClean="0"/>
               <a:t>第二级</a:t>
             </a:r>
+            <a:endParaRPr lang="zh-CN" altLang="en-US" smtClean="0"/>
           </a:p>
           <a:p>
             <a:pPr lvl="2"/>
@@ -1443,6 +1428,7 @@
               <a:rPr lang="zh-CN" altLang="en-US" smtClean="0"/>
               <a:t>第三级</a:t>
             </a:r>
+            <a:endParaRPr lang="zh-CN" altLang="en-US" smtClean="0"/>
           </a:p>
           <a:p>
             <a:pPr lvl="3"/>
@@ -1450,6 +1436,7 @@
               <a:rPr lang="zh-CN" altLang="en-US" smtClean="0"/>
               <a:t>第四级</a:t>
             </a:r>
+            <a:endParaRPr lang="zh-CN" altLang="en-US" smtClean="0"/>
           </a:p>
           <a:p>
             <a:pPr lvl="4"/>
@@ -1523,6 +1510,7 @@
               <a:rPr lang="zh-CN" altLang="en-US" smtClean="0"/>
               <a:t>单击此处编辑母版文本样式</a:t>
             </a:r>
+            <a:endParaRPr lang="zh-CN" altLang="en-US" smtClean="0"/>
           </a:p>
         </p:txBody>
       </p:sp>
@@ -1551,6 +1539,7 @@
               <a:rPr lang="zh-CN" altLang="en-US" smtClean="0"/>
               <a:t>单击此处编辑母版文本样式</a:t>
             </a:r>
+            <a:endParaRPr lang="zh-CN" altLang="en-US" smtClean="0"/>
           </a:p>
           <a:p>
             <a:pPr lvl="1"/>
@@ -1558,6 +1547,7 @@
               <a:rPr lang="zh-CN" altLang="en-US" smtClean="0"/>
               <a:t>第二级</a:t>
             </a:r>
+            <a:endParaRPr lang="zh-CN" altLang="en-US" smtClean="0"/>
           </a:p>
           <a:p>
             <a:pPr lvl="2"/>
@@ -1565,6 +1555,7 @@
               <a:rPr lang="zh-CN" altLang="en-US" smtClean="0"/>
               <a:t>第三级</a:t>
             </a:r>
+            <a:endParaRPr lang="zh-CN" altLang="en-US" smtClean="0"/>
           </a:p>
           <a:p>
             <a:pPr lvl="3"/>
@@ -1572,6 +1563,7 @@
               <a:rPr lang="zh-CN" altLang="en-US" smtClean="0"/>
               <a:t>第四级</a:t>
             </a:r>
+            <a:endParaRPr lang="zh-CN" altLang="en-US" smtClean="0"/>
           </a:p>
           <a:p>
             <a:pPr lvl="4"/>
@@ -1600,7 +1592,6 @@
           <a:p>
             <a:fld id="{D997B5FA-0921-464F-AAE1-844C04324D75}" type="datetimeFigureOut">
               <a:rPr lang="zh-CN" altLang="en-US" smtClean="0"/>
-              <a:t>2015/5/5</a:t>
             </a:fld>
             <a:endParaRPr lang="zh-CN" altLang="en-US"/>
           </a:p>
@@ -1642,18 +1633,12 @@
           <a:p>
             <a:fld id="{565CE74E-AB26-4998-AD42-012C4C1AD076}" type="slidenum">
               <a:rPr lang="zh-CN" altLang="en-US" smtClean="0"/>
-              <a:t>‹#›</a:t>
             </a:fld>
             <a:endParaRPr lang="zh-CN" altLang="en-US"/>
           </a:p>
         </p:txBody>
       </p:sp>
     </p:spTree>
-    <p:extLst>
-      <p:ext uri="{BB962C8B-B14F-4D97-AF65-F5344CB8AC3E}">
-        <p14:creationId xmlns:p14="http://schemas.microsoft.com/office/powerpoint/2010/main" val="168117047"/>
-      </p:ext>
-    </p:extLst>
   </p:cSld>
   <p:clrMapOvr>
     <a:masterClrMapping/>
@@ -1718,7 +1703,6 @@
           <a:p>
             <a:fld id="{D997B5FA-0921-464F-AAE1-844C04324D75}" type="datetimeFigureOut">
               <a:rPr lang="zh-CN" altLang="en-US" smtClean="0"/>
-              <a:t>2015/5/5</a:t>
             </a:fld>
             <a:endParaRPr lang="zh-CN" altLang="en-US"/>
           </a:p>
@@ -1760,18 +1744,12 @@
           <a:p>
             <a:fld id="{565CE74E-AB26-4998-AD42-012C4C1AD076}" type="slidenum">
               <a:rPr lang="zh-CN" altLang="en-US" smtClean="0"/>
-              <a:t>‹#›</a:t>
             </a:fld>
             <a:endParaRPr lang="zh-CN" altLang="en-US"/>
           </a:p>
         </p:txBody>
       </p:sp>
     </p:spTree>
-    <p:extLst>
-      <p:ext uri="{BB962C8B-B14F-4D97-AF65-F5344CB8AC3E}">
-        <p14:creationId xmlns:p14="http://schemas.microsoft.com/office/powerpoint/2010/main" val="2764406021"/>
-      </p:ext>
-    </p:extLst>
   </p:cSld>
   <p:clrMapOvr>
     <a:masterClrMapping/>
@@ -1813,7 +1791,6 @@
           <a:p>
             <a:fld id="{D997B5FA-0921-464F-AAE1-844C04324D75}" type="datetimeFigureOut">
               <a:rPr lang="zh-CN" altLang="en-US" smtClean="0"/>
-              <a:t>2015/5/5</a:t>
             </a:fld>
             <a:endParaRPr lang="zh-CN" altLang="en-US"/>
           </a:p>
@@ -1855,18 +1832,12 @@
           <a:p>
             <a:fld id="{565CE74E-AB26-4998-AD42-012C4C1AD076}" type="slidenum">
               <a:rPr lang="zh-CN" altLang="en-US" smtClean="0"/>
-              <a:t>‹#›</a:t>
             </a:fld>
             <a:endParaRPr lang="zh-CN" altLang="en-US"/>
           </a:p>
         </p:txBody>
       </p:sp>
     </p:spTree>
-    <p:extLst>
-      <p:ext uri="{BB962C8B-B14F-4D97-AF65-F5344CB8AC3E}">
-        <p14:creationId xmlns:p14="http://schemas.microsoft.com/office/powerpoint/2010/main" val="276523006"/>
-      </p:ext>
-    </p:extLst>
   </p:cSld>
   <p:clrMapOvr>
     <a:masterClrMapping/>
@@ -1976,6 +1947,7 @@
               <a:rPr lang="zh-CN" altLang="en-US" smtClean="0"/>
               <a:t>单击此处编辑母版文本样式</a:t>
             </a:r>
+            <a:endParaRPr lang="zh-CN" altLang="en-US" smtClean="0"/>
           </a:p>
           <a:p>
             <a:pPr lvl="1"/>
@@ -1983,6 +1955,7 @@
               <a:rPr lang="zh-CN" altLang="en-US" smtClean="0"/>
               <a:t>第二级</a:t>
             </a:r>
+            <a:endParaRPr lang="zh-CN" altLang="en-US" smtClean="0"/>
           </a:p>
           <a:p>
             <a:pPr lvl="2"/>
@@ -1990,6 +1963,7 @@
               <a:rPr lang="zh-CN" altLang="en-US" smtClean="0"/>
               <a:t>第三级</a:t>
             </a:r>
+            <a:endParaRPr lang="zh-CN" altLang="en-US" smtClean="0"/>
           </a:p>
           <a:p>
             <a:pPr lvl="3"/>
@@ -1997,6 +1971,7 @@
               <a:rPr lang="zh-CN" altLang="en-US" smtClean="0"/>
               <a:t>第四级</a:t>
             </a:r>
+            <a:endParaRPr lang="zh-CN" altLang="en-US" smtClean="0"/>
           </a:p>
           <a:p>
             <a:pPr lvl="4"/>
@@ -2070,6 +2045,7 @@
               <a:rPr lang="zh-CN" altLang="en-US" smtClean="0"/>
               <a:t>单击此处编辑母版文本样式</a:t>
             </a:r>
+            <a:endParaRPr lang="zh-CN" altLang="en-US" smtClean="0"/>
           </a:p>
         </p:txBody>
       </p:sp>
@@ -2090,7 +2066,6 @@
           <a:p>
             <a:fld id="{D997B5FA-0921-464F-AAE1-844C04324D75}" type="datetimeFigureOut">
               <a:rPr lang="zh-CN" altLang="en-US" smtClean="0"/>
-              <a:t>2015/5/5</a:t>
             </a:fld>
             <a:endParaRPr lang="zh-CN" altLang="en-US"/>
           </a:p>
@@ -2132,18 +2107,12 @@
           <a:p>
             <a:fld id="{565CE74E-AB26-4998-AD42-012C4C1AD076}" type="slidenum">
               <a:rPr lang="zh-CN" altLang="en-US" smtClean="0"/>
-              <a:t>‹#›</a:t>
             </a:fld>
             <a:endParaRPr lang="zh-CN" altLang="en-US"/>
           </a:p>
         </p:txBody>
       </p:sp>
     </p:spTree>
-    <p:extLst>
-      <p:ext uri="{BB962C8B-B14F-4D97-AF65-F5344CB8AC3E}">
-        <p14:creationId xmlns:p14="http://schemas.microsoft.com/office/powerpoint/2010/main" val="694758376"/>
-      </p:ext>
-    </p:extLst>
   </p:cSld>
   <p:clrMapOvr>
     <a:masterClrMapping/>
@@ -2323,6 +2292,7 @@
               <a:rPr lang="zh-CN" altLang="en-US" smtClean="0"/>
               <a:t>单击此处编辑母版文本样式</a:t>
             </a:r>
+            <a:endParaRPr lang="zh-CN" altLang="en-US" smtClean="0"/>
           </a:p>
         </p:txBody>
       </p:sp>
@@ -2343,7 +2313,6 @@
           <a:p>
             <a:fld id="{D997B5FA-0921-464F-AAE1-844C04324D75}" type="datetimeFigureOut">
               <a:rPr lang="zh-CN" altLang="en-US" smtClean="0"/>
-              <a:t>2015/5/5</a:t>
             </a:fld>
             <a:endParaRPr lang="zh-CN" altLang="en-US"/>
           </a:p>
@@ -2385,18 +2354,12 @@
           <a:p>
             <a:fld id="{565CE74E-AB26-4998-AD42-012C4C1AD076}" type="slidenum">
               <a:rPr lang="zh-CN" altLang="en-US" smtClean="0"/>
-              <a:t>‹#›</a:t>
             </a:fld>
             <a:endParaRPr lang="zh-CN" altLang="en-US"/>
           </a:p>
         </p:txBody>
       </p:sp>
     </p:spTree>
-    <p:extLst>
-      <p:ext uri="{BB962C8B-B14F-4D97-AF65-F5344CB8AC3E}">
-        <p14:creationId xmlns:p14="http://schemas.microsoft.com/office/powerpoint/2010/main" val="477805659"/>
-      </p:ext>
-    </p:extLst>
   </p:cSld>
   <p:clrMapOvr>
     <a:masterClrMapping/>
@@ -2489,6 +2452,7 @@
               <a:rPr lang="zh-CN" altLang="en-US" smtClean="0"/>
               <a:t>单击此处编辑母版文本样式</a:t>
             </a:r>
+            <a:endParaRPr lang="zh-CN" altLang="en-US" smtClean="0"/>
           </a:p>
           <a:p>
             <a:pPr lvl="1"/>
@@ -2496,6 +2460,7 @@
               <a:rPr lang="zh-CN" altLang="en-US" smtClean="0"/>
               <a:t>第二级</a:t>
             </a:r>
+            <a:endParaRPr lang="zh-CN" altLang="en-US" smtClean="0"/>
           </a:p>
           <a:p>
             <a:pPr lvl="2"/>
@@ -2503,6 +2468,7 @@
               <a:rPr lang="zh-CN" altLang="en-US" smtClean="0"/>
               <a:t>第三级</a:t>
             </a:r>
+            <a:endParaRPr lang="zh-CN" altLang="en-US" smtClean="0"/>
           </a:p>
           <a:p>
             <a:pPr lvl="3"/>
@@ -2510,6 +2476,7 @@
               <a:rPr lang="zh-CN" altLang="en-US" smtClean="0"/>
               <a:t>第四级</a:t>
             </a:r>
+            <a:endParaRPr lang="zh-CN" altLang="en-US" smtClean="0"/>
           </a:p>
           <a:p>
             <a:pPr lvl="4"/>
@@ -2556,7 +2523,6 @@
           <a:p>
             <a:fld id="{D997B5FA-0921-464F-AAE1-844C04324D75}" type="datetimeFigureOut">
               <a:rPr lang="zh-CN" altLang="en-US" smtClean="0"/>
-              <a:t>2015/5/5</a:t>
             </a:fld>
             <a:endParaRPr lang="zh-CN" altLang="en-US"/>
           </a:p>
@@ -2634,18 +2600,12 @@
           <a:p>
             <a:fld id="{565CE74E-AB26-4998-AD42-012C4C1AD076}" type="slidenum">
               <a:rPr lang="zh-CN" altLang="en-US" smtClean="0"/>
-              <a:t>‹#›</a:t>
             </a:fld>
             <a:endParaRPr lang="zh-CN" altLang="en-US"/>
           </a:p>
         </p:txBody>
       </p:sp>
     </p:spTree>
-    <p:extLst>
-      <p:ext uri="{BB962C8B-B14F-4D97-AF65-F5344CB8AC3E}">
-        <p14:creationId xmlns:p14="http://schemas.microsoft.com/office/powerpoint/2010/main" val="2003094035"/>
-      </p:ext>
-    </p:extLst>
   </p:cSld>
   <p:clrMap bg1="lt1" tx1="dk1" bg2="lt2" tx2="dk2" accent1="accent1" accent2="accent2" accent3="accent3" accent4="accent4" accent5="accent5" accent6="accent6" hlink="hlink" folHlink="folHlink"/>
   <p:sldLayoutIdLst>
@@ -2689,7 +2649,7 @@
         <a:spcBef>
           <a:spcPts val="1000"/>
         </a:spcBef>
-        <a:buFont typeface="Arial" panose="020B0604020202020204" pitchFamily="34" charset="0"/>
+        <a:buFont typeface="Arial" panose="02080604020202020204" pitchFamily="34" charset="0"/>
         <a:buChar char="•"/>
         <a:defRPr sz="2800" kern="1200">
           <a:solidFill>
@@ -2707,7 +2667,7 @@
         <a:spcBef>
           <a:spcPts val="500"/>
         </a:spcBef>
-        <a:buFont typeface="Arial" panose="020B0604020202020204" pitchFamily="34" charset="0"/>
+        <a:buFont typeface="Arial" panose="02080604020202020204" pitchFamily="34" charset="0"/>
         <a:buChar char="•"/>
         <a:defRPr sz="2400" kern="1200">
           <a:solidFill>
@@ -2725,7 +2685,7 @@
         <a:spcBef>
           <a:spcPts val="500"/>
         </a:spcBef>
-        <a:buFont typeface="Arial" panose="020B0604020202020204" pitchFamily="34" charset="0"/>
+        <a:buFont typeface="Arial" panose="02080604020202020204" pitchFamily="34" charset="0"/>
         <a:buChar char="•"/>
         <a:defRPr sz="2000" kern="1200">
           <a:solidFill>
@@ -2743,7 +2703,7 @@
         <a:spcBef>
           <a:spcPts val="500"/>
         </a:spcBef>
-        <a:buFont typeface="Arial" panose="020B0604020202020204" pitchFamily="34" charset="0"/>
+        <a:buFont typeface="Arial" panose="02080604020202020204" pitchFamily="34" charset="0"/>
         <a:buChar char="•"/>
         <a:defRPr sz="1800" kern="1200">
           <a:solidFill>
@@ -2761,7 +2721,7 @@
         <a:spcBef>
           <a:spcPts val="500"/>
         </a:spcBef>
-        <a:buFont typeface="Arial" panose="020B0604020202020204" pitchFamily="34" charset="0"/>
+        <a:buFont typeface="Arial" panose="02080604020202020204" pitchFamily="34" charset="0"/>
         <a:buChar char="•"/>
         <a:defRPr sz="1800" kern="1200">
           <a:solidFill>
@@ -2779,7 +2739,7 @@
         <a:spcBef>
           <a:spcPts val="500"/>
         </a:spcBef>
-        <a:buFont typeface="Arial" panose="020B0604020202020204" pitchFamily="34" charset="0"/>
+        <a:buFont typeface="Arial" panose="02080604020202020204" pitchFamily="34" charset="0"/>
         <a:buChar char="•"/>
         <a:defRPr sz="1800" kern="1200">
           <a:solidFill>
@@ -2797,7 +2757,7 @@
         <a:spcBef>
           <a:spcPts val="500"/>
         </a:spcBef>
-        <a:buFont typeface="Arial" panose="020B0604020202020204" pitchFamily="34" charset="0"/>
+        <a:buFont typeface="Arial" panose="02080604020202020204" pitchFamily="34" charset="0"/>
         <a:buChar char="•"/>
         <a:defRPr sz="1800" kern="1200">
           <a:solidFill>
@@ -2815,7 +2775,7 @@
         <a:spcBef>
           <a:spcPts val="500"/>
         </a:spcBef>
-        <a:buFont typeface="Arial" panose="020B0604020202020204" pitchFamily="34" charset="0"/>
+        <a:buFont typeface="Arial" panose="02080604020202020204" pitchFamily="34" charset="0"/>
         <a:buChar char="•"/>
         <a:defRPr sz="1800" kern="1200">
           <a:solidFill>
@@ -2833,7 +2793,7 @@
         <a:spcBef>
           <a:spcPts val="500"/>
         </a:spcBef>
-        <a:buFont typeface="Arial" panose="020B0604020202020204" pitchFamily="34" charset="0"/>
+        <a:buFont typeface="Arial" panose="02080604020202020204" pitchFamily="34" charset="0"/>
         <a:buChar char="•"/>
         <a:defRPr sz="1800" kern="1200">
           <a:solidFill>
@@ -2944,6 +2904,72 @@
 </p:sldMaster>
 </file>
 
+<file path=ppt/slides/slide1.xml><?xml version="1.0" encoding="utf-8"?>
+<p:sld xmlns:a="http://schemas.openxmlformats.org/drawingml/2006/main" xmlns:r="http://schemas.openxmlformats.org/officeDocument/2006/relationships" xmlns:p="http://schemas.openxmlformats.org/presentationml/2006/main">
+  <p:cSld>
+    <p:spTree>
+      <p:nvGrpSpPr>
+        <p:cNvPr id="1" name=""/>
+        <p:cNvGrpSpPr/>
+        <p:nvPr/>
+      </p:nvGrpSpPr>
+      <p:grpSpPr/>
+      <p:pic>
+        <p:nvPicPr>
+          <p:cNvPr id="4" name="Picture 3"/>
+          <p:cNvPicPr>
+            <a:picLocks noChangeAspect="1"/>
+          </p:cNvPicPr>
+          <p:nvPr/>
+        </p:nvPicPr>
+        <p:blipFill>
+          <a:blip r:embed="rId1"/>
+          <a:stretch>
+            <a:fillRect/>
+          </a:stretch>
+        </p:blipFill>
+        <p:spPr>
+          <a:xfrm>
+            <a:off x="2649220" y="1524000"/>
+            <a:ext cx="2076450" cy="1762125"/>
+          </a:xfrm>
+          <a:prstGeom prst="rect">
+            <a:avLst/>
+          </a:prstGeom>
+        </p:spPr>
+      </p:pic>
+      <p:pic>
+        <p:nvPicPr>
+          <p:cNvPr id="5" name="Picture 4"/>
+          <p:cNvPicPr>
+            <a:picLocks noChangeAspect="1"/>
+          </p:cNvPicPr>
+          <p:nvPr/>
+        </p:nvPicPr>
+        <p:blipFill>
+          <a:blip r:embed="rId2"/>
+          <a:stretch>
+            <a:fillRect/>
+          </a:stretch>
+        </p:blipFill>
+        <p:spPr>
+          <a:xfrm>
+            <a:off x="5000625" y="1543050"/>
+            <a:ext cx="1647825" cy="1724025"/>
+          </a:xfrm>
+          <a:prstGeom prst="rect">
+            <a:avLst/>
+          </a:prstGeom>
+        </p:spPr>
+      </p:pic>
+    </p:spTree>
+  </p:cSld>
+  <p:clrMapOvr>
+    <a:masterClrMapping/>
+  </p:clrMapOvr>
+</p:sld>
+</file>
+
 <file path=ppt/theme/theme1.xml><?xml version="1.0" encoding="utf-8"?>
 <a:theme xmlns:a="http://schemas.openxmlformats.org/drawingml/2006/main" name="Office 主题">
   <a:themeElements>
@@ -2987,7 +3013,7 @@
     </a:clrScheme>
     <a:fontScheme name="Office">
       <a:majorFont>
-        <a:latin typeface="Calibri Light" panose="020F0302020204030204"/>
+        <a:latin typeface="Calibri Light"/>
         <a:ea typeface=""/>
         <a:cs typeface=""/>
         <a:font script="Jpan" typeface="ＭＳ Ｐゴシック"/>
@@ -3022,7 +3048,7 @@
         <a:font script="Geor" typeface="Sylfaen"/>
       </a:majorFont>
       <a:minorFont>
-        <a:latin typeface="Calibri" panose="020F0502020204030204"/>
+        <a:latin typeface="Calibri"/>
         <a:ea typeface=""/>
         <a:cs typeface=""/>
         <a:font script="Jpan" typeface="ＭＳ Ｐゴシック"/>
@@ -3195,8 +3221,6 @@
       </a:bgFillStyleLst>
     </a:fmtScheme>
   </a:themeElements>
-  <a:objectDefaults/>
-  <a:extraClrSchemeLst/>
   <a:extLst>
     <a:ext uri="{05A4C25C-085E-4340-85A3-A5531E510DB2}">
       <thm15:themeFamily xmlns:thm15="http://schemas.microsoft.com/office/thememl/2012/main" name="Office Theme" id="{62F939B6-93AF-4DB8-9C6B-D6C7DFDC589F}" vid="{4A3C46E8-61CC-4603-A589-7422A47A8E4A}"/>

</xml_diff>

<commit_message>
added more info to eligibility trace
</commit_message>
<xml_diff>
--- a/RL/theoretical/Equations/pictures/Untitled PPTX 演示文稿.pptx
+++ b/RL/theoretical/Equations/pictures/Untitled PPTX 演示文稿.pptx
@@ -7,6 +7,7 @@
   <p:sldIdLst>
     <p:sldId id="256" r:id="rId3"/>
     <p:sldId id="257" r:id="rId4"/>
+    <p:sldId id="258" r:id="rId5"/>
   </p:sldIdLst>
   <p:sldSz cx="12192000" cy="6858000"/>
   <p:notesSz cx="6858000" cy="9144000"/>
@@ -3815,6 +3816,124 @@
 </p:sld>
 </file>
 
+<file path=ppt/slides/slide3.xml><?xml version="1.0" encoding="utf-8"?>
+<p:sld xmlns:a="http://schemas.openxmlformats.org/drawingml/2006/main" xmlns:r="http://schemas.openxmlformats.org/officeDocument/2006/relationships" xmlns:p="http://schemas.openxmlformats.org/presentationml/2006/main">
+  <p:cSld>
+    <p:spTree>
+      <p:nvGrpSpPr>
+        <p:cNvPr id="1" name=""/>
+        <p:cNvGrpSpPr/>
+        <p:nvPr/>
+      </p:nvGrpSpPr>
+      <p:grpSpPr/>
+      <p:pic>
+        <p:nvPicPr>
+          <p:cNvPr id="4" name="Picture 3" descr="offline_nstep_td_results"/>
+          <p:cNvPicPr>
+            <a:picLocks noChangeAspect="1"/>
+          </p:cNvPicPr>
+          <p:nvPr/>
+        </p:nvPicPr>
+        <p:blipFill>
+          <a:blip r:embed="rId1"/>
+          <a:srcRect l="27264"/>
+          <a:stretch>
+            <a:fillRect/>
+          </a:stretch>
+        </p:blipFill>
+        <p:spPr>
+          <a:xfrm>
+            <a:off x="5258435" y="2844800"/>
+            <a:ext cx="3427095" cy="2408555"/>
+          </a:xfrm>
+          <a:prstGeom prst="rect">
+            <a:avLst/>
+          </a:prstGeom>
+        </p:spPr>
+      </p:pic>
+      <p:pic>
+        <p:nvPicPr>
+          <p:cNvPr id="5" name="Picture 4" descr="online_nstep_td_results"/>
+          <p:cNvPicPr>
+            <a:picLocks noChangeAspect="1"/>
+          </p:cNvPicPr>
+          <p:nvPr/>
+        </p:nvPicPr>
+        <p:blipFill>
+          <a:blip r:embed="rId2"/>
+          <a:srcRect l="27212"/>
+          <a:stretch>
+            <a:fillRect/>
+          </a:stretch>
+        </p:blipFill>
+        <p:spPr>
+          <a:xfrm>
+            <a:off x="1983740" y="2844800"/>
+            <a:ext cx="3274695" cy="2351405"/>
+          </a:xfrm>
+          <a:prstGeom prst="rect">
+            <a:avLst/>
+          </a:prstGeom>
+        </p:spPr>
+      </p:pic>
+      <p:pic>
+        <p:nvPicPr>
+          <p:cNvPr id="6" name="Picture 5" descr="offline_ET_results"/>
+          <p:cNvPicPr>
+            <a:picLocks noChangeAspect="1"/>
+          </p:cNvPicPr>
+          <p:nvPr/>
+        </p:nvPicPr>
+        <p:blipFill>
+          <a:blip r:embed="rId3"/>
+          <a:srcRect l="26402"/>
+          <a:stretch>
+            <a:fillRect/>
+          </a:stretch>
+        </p:blipFill>
+        <p:spPr>
+          <a:xfrm>
+            <a:off x="5238115" y="384810"/>
+            <a:ext cx="3467735" cy="2459990"/>
+          </a:xfrm>
+          <a:prstGeom prst="rect">
+            <a:avLst/>
+          </a:prstGeom>
+        </p:spPr>
+      </p:pic>
+      <p:pic>
+        <p:nvPicPr>
+          <p:cNvPr id="7" name="Picture 6" descr="online_ET_results"/>
+          <p:cNvPicPr>
+            <a:picLocks noChangeAspect="1"/>
+          </p:cNvPicPr>
+          <p:nvPr/>
+        </p:nvPicPr>
+        <p:blipFill>
+          <a:blip r:embed="rId4"/>
+          <a:srcRect l="20816"/>
+          <a:stretch>
+            <a:fillRect/>
+          </a:stretch>
+        </p:blipFill>
+        <p:spPr>
+          <a:xfrm>
+            <a:off x="1983740" y="384810"/>
+            <a:ext cx="2748915" cy="2459990"/>
+          </a:xfrm>
+          <a:prstGeom prst="rect">
+            <a:avLst/>
+          </a:prstGeom>
+        </p:spPr>
+      </p:pic>
+    </p:spTree>
+  </p:cSld>
+  <p:clrMapOvr>
+    <a:masterClrMapping/>
+  </p:clrMapOvr>
+</p:sld>
+</file>
+
 <file path=ppt/theme/theme1.xml><?xml version="1.0" encoding="utf-8"?>
 <a:theme xmlns:a="http://schemas.openxmlformats.org/drawingml/2006/main" name="Office 主题">
   <a:themeElements>

</xml_diff>

<commit_message>
finished first draft of notes
</commit_message>
<xml_diff>
--- a/RL/theoretical/Equations/pictures/Untitled PPTX 演示文稿.pptx
+++ b/RL/theoretical/Equations/pictures/Untitled PPTX 演示文稿.pptx
@@ -8,6 +8,10 @@
     <p:sldId id="256" r:id="rId3"/>
     <p:sldId id="257" r:id="rId4"/>
     <p:sldId id="258" r:id="rId5"/>
+    <p:sldId id="259" r:id="rId6"/>
+    <p:sldId id="260" r:id="rId7"/>
+    <p:sldId id="261" r:id="rId8"/>
+    <p:sldId id="262" r:id="rId9"/>
   </p:sldIdLst>
   <p:sldSz cx="12192000" cy="6858000"/>
   <p:notesSz cx="6858000" cy="9144000"/>
@@ -3934,6 +3938,314 @@
 </p:sld>
 </file>
 
+<file path=ppt/slides/slide4.xml><?xml version="1.0" encoding="utf-8"?>
+<p:sld xmlns:a="http://schemas.openxmlformats.org/drawingml/2006/main" xmlns:r="http://schemas.openxmlformats.org/officeDocument/2006/relationships" xmlns:p="http://schemas.openxmlformats.org/presentationml/2006/main">
+  <p:cSld>
+    <p:spTree>
+      <p:nvGrpSpPr>
+        <p:cNvPr id="1" name=""/>
+        <p:cNvGrpSpPr/>
+        <p:nvPr/>
+      </p:nvGrpSpPr>
+      <p:grpSpPr/>
+      <p:pic>
+        <p:nvPicPr>
+          <p:cNvPr id="4" name="Content Placeholder 3"/>
+          <p:cNvPicPr>
+            <a:picLocks noChangeAspect="1"/>
+          </p:cNvPicPr>
+          <p:nvPr>
+            <p:ph idx="1"/>
+          </p:nvPr>
+        </p:nvPicPr>
+        <p:blipFill>
+          <a:blip r:embed="rId1"/>
+          <a:stretch>
+            <a:fillRect/>
+          </a:stretch>
+        </p:blipFill>
+        <p:spPr>
+          <a:xfrm>
+            <a:off x="2976245" y="231140"/>
+            <a:ext cx="6238875" cy="3105150"/>
+          </a:xfrm>
+          <a:prstGeom prst="rect">
+            <a:avLst/>
+          </a:prstGeom>
+        </p:spPr>
+      </p:pic>
+      <p:pic>
+        <p:nvPicPr>
+          <p:cNvPr id="5" name="Picture 4"/>
+          <p:cNvPicPr>
+            <a:picLocks noChangeAspect="1"/>
+          </p:cNvPicPr>
+          <p:nvPr/>
+        </p:nvPicPr>
+        <p:blipFill>
+          <a:blip r:embed="rId2"/>
+          <a:stretch>
+            <a:fillRect/>
+          </a:stretch>
+        </p:blipFill>
+        <p:spPr>
+          <a:xfrm>
+            <a:off x="2990850" y="3336290"/>
+            <a:ext cx="6210300" cy="3086100"/>
+          </a:xfrm>
+          <a:prstGeom prst="rect">
+            <a:avLst/>
+          </a:prstGeom>
+        </p:spPr>
+      </p:pic>
+    </p:spTree>
+  </p:cSld>
+  <p:clrMapOvr>
+    <a:masterClrMapping/>
+  </p:clrMapOvr>
+</p:sld>
+</file>
+
+<file path=ppt/slides/slide5.xml><?xml version="1.0" encoding="utf-8"?>
+<p:sld xmlns:a="http://schemas.openxmlformats.org/drawingml/2006/main" xmlns:r="http://schemas.openxmlformats.org/officeDocument/2006/relationships" xmlns:p="http://schemas.openxmlformats.org/presentationml/2006/main">
+  <p:cSld>
+    <p:spTree>
+      <p:nvGrpSpPr>
+        <p:cNvPr id="1" name=""/>
+        <p:cNvGrpSpPr/>
+        <p:nvPr/>
+      </p:nvGrpSpPr>
+      <p:grpSpPr/>
+      <p:sp>
+        <p:nvSpPr>
+          <p:cNvPr id="2" name="Title 1"/>
+          <p:cNvSpPr>
+            <a:spLocks noGrp="1"/>
+          </p:cNvSpPr>
+          <p:nvPr>
+            <p:ph type="title"/>
+          </p:nvPr>
+        </p:nvSpPr>
+        <p:spPr/>
+        <p:txBody>
+          <a:bodyPr/>
+          <a:p>
+            <a:endParaRPr lang="en-US"/>
+          </a:p>
+        </p:txBody>
+      </p:sp>
+      <p:pic>
+        <p:nvPicPr>
+          <p:cNvPr id="4" name="Content Placeholder 3"/>
+          <p:cNvPicPr>
+            <a:picLocks noChangeAspect="1"/>
+          </p:cNvPicPr>
+          <p:nvPr>
+            <p:ph idx="1"/>
+          </p:nvPr>
+        </p:nvPicPr>
+        <p:blipFill>
+          <a:blip r:embed="rId1"/>
+          <a:stretch>
+            <a:fillRect/>
+          </a:stretch>
+        </p:blipFill>
+        <p:spPr>
+          <a:xfrm>
+            <a:off x="5962015" y="2159635"/>
+            <a:ext cx="2581910" cy="3019425"/>
+          </a:xfrm>
+          <a:prstGeom prst="rect">
+            <a:avLst/>
+          </a:prstGeom>
+        </p:spPr>
+      </p:pic>
+      <p:pic>
+        <p:nvPicPr>
+          <p:cNvPr id="5" name="Picture 4" descr="eligibility_trace_online"/>
+          <p:cNvPicPr>
+            <a:picLocks noChangeAspect="1"/>
+          </p:cNvPicPr>
+          <p:nvPr/>
+        </p:nvPicPr>
+        <p:blipFill>
+          <a:blip r:embed="rId2"/>
+          <a:stretch>
+            <a:fillRect/>
+          </a:stretch>
+        </p:blipFill>
+        <p:spPr>
+          <a:xfrm>
+            <a:off x="1151890" y="2159635"/>
+            <a:ext cx="4810125" cy="3019425"/>
+          </a:xfrm>
+          <a:prstGeom prst="rect">
+            <a:avLst/>
+          </a:prstGeom>
+        </p:spPr>
+      </p:pic>
+    </p:spTree>
+  </p:cSld>
+  <p:clrMapOvr>
+    <a:masterClrMapping/>
+  </p:clrMapOvr>
+</p:sld>
+</file>
+
+<file path=ppt/slides/slide6.xml><?xml version="1.0" encoding="utf-8"?>
+<p:sld xmlns:a="http://schemas.openxmlformats.org/drawingml/2006/main" xmlns:r="http://schemas.openxmlformats.org/officeDocument/2006/relationships" xmlns:p="http://schemas.openxmlformats.org/presentationml/2006/main">
+  <p:cSld>
+    <p:spTree>
+      <p:nvGrpSpPr>
+        <p:cNvPr id="1" name=""/>
+        <p:cNvGrpSpPr/>
+        <p:nvPr/>
+      </p:nvGrpSpPr>
+      <p:grpSpPr/>
+      <p:sp>
+        <p:nvSpPr>
+          <p:cNvPr id="2" name="Title 1"/>
+          <p:cNvSpPr>
+            <a:spLocks noGrp="1"/>
+          </p:cNvSpPr>
+          <p:nvPr>
+            <p:ph type="title"/>
+          </p:nvPr>
+        </p:nvSpPr>
+        <p:spPr/>
+        <p:txBody>
+          <a:bodyPr/>
+          <a:p>
+            <a:endParaRPr lang="en-US"/>
+          </a:p>
+        </p:txBody>
+      </p:sp>
+      <p:pic>
+        <p:nvPicPr>
+          <p:cNvPr id="4" name="Picture 3" descr="sarsa_lambda"/>
+          <p:cNvPicPr>
+            <a:picLocks noChangeAspect="1"/>
+          </p:cNvPicPr>
+          <p:nvPr/>
+        </p:nvPicPr>
+        <p:blipFill>
+          <a:blip r:embed="rId1"/>
+          <a:stretch>
+            <a:fillRect/>
+          </a:stretch>
+        </p:blipFill>
+        <p:spPr>
+          <a:xfrm>
+            <a:off x="1866900" y="2195195"/>
+            <a:ext cx="5648325" cy="3028950"/>
+          </a:xfrm>
+          <a:prstGeom prst="rect">
+            <a:avLst/>
+          </a:prstGeom>
+        </p:spPr>
+      </p:pic>
+      <p:pic>
+        <p:nvPicPr>
+          <p:cNvPr id="5" name="Content Placeholder 4"/>
+          <p:cNvPicPr>
+            <a:picLocks noChangeAspect="1"/>
+          </p:cNvPicPr>
+          <p:nvPr>
+            <p:ph idx="1"/>
+          </p:nvPr>
+        </p:nvPicPr>
+        <p:blipFill>
+          <a:blip r:embed="rId2"/>
+          <a:stretch>
+            <a:fillRect/>
+          </a:stretch>
+        </p:blipFill>
+        <p:spPr>
+          <a:xfrm>
+            <a:off x="7515225" y="2195195"/>
+            <a:ext cx="3220720" cy="3028950"/>
+          </a:xfrm>
+          <a:prstGeom prst="rect">
+            <a:avLst/>
+          </a:prstGeom>
+        </p:spPr>
+      </p:pic>
+    </p:spTree>
+  </p:cSld>
+  <p:clrMapOvr>
+    <a:masterClrMapping/>
+  </p:clrMapOvr>
+</p:sld>
+</file>
+
+<file path=ppt/slides/slide7.xml><?xml version="1.0" encoding="utf-8"?>
+<p:sld xmlns:a="http://schemas.openxmlformats.org/drawingml/2006/main" xmlns:r="http://schemas.openxmlformats.org/officeDocument/2006/relationships" xmlns:p="http://schemas.openxmlformats.org/presentationml/2006/main">
+  <p:cSld>
+    <p:spTree>
+      <p:nvGrpSpPr>
+        <p:cNvPr id="1" name=""/>
+        <p:cNvGrpSpPr/>
+        <p:nvPr/>
+      </p:nvGrpSpPr>
+      <p:grpSpPr/>
+      <p:pic>
+        <p:nvPicPr>
+          <p:cNvPr id="4" name="Content Placeholder 3"/>
+          <p:cNvPicPr>
+            <a:picLocks noChangeAspect="1"/>
+          </p:cNvPicPr>
+          <p:nvPr>
+            <p:ph idx="1"/>
+          </p:nvPr>
+        </p:nvPicPr>
+        <p:blipFill>
+          <a:blip r:embed="rId1"/>
+          <a:stretch>
+            <a:fillRect/>
+          </a:stretch>
+        </p:blipFill>
+        <p:spPr>
+          <a:xfrm>
+            <a:off x="1370965" y="1083945"/>
+            <a:ext cx="5219700" cy="3829050"/>
+          </a:xfrm>
+          <a:prstGeom prst="rect">
+            <a:avLst/>
+          </a:prstGeom>
+        </p:spPr>
+      </p:pic>
+      <p:pic>
+        <p:nvPicPr>
+          <p:cNvPr id="5" name="Picture 4"/>
+          <p:cNvPicPr>
+            <a:picLocks noChangeAspect="1"/>
+          </p:cNvPicPr>
+          <p:nvPr/>
+        </p:nvPicPr>
+        <p:blipFill>
+          <a:blip r:embed="rId2"/>
+          <a:stretch>
+            <a:fillRect/>
+          </a:stretch>
+        </p:blipFill>
+        <p:spPr>
+          <a:xfrm>
+            <a:off x="6590665" y="1083945"/>
+            <a:ext cx="3190875" cy="3571875"/>
+          </a:xfrm>
+          <a:prstGeom prst="rect">
+            <a:avLst/>
+          </a:prstGeom>
+        </p:spPr>
+      </p:pic>
+    </p:spTree>
+  </p:cSld>
+  <p:clrMapOvr>
+    <a:masterClrMapping/>
+  </p:clrMapOvr>
+</p:sld>
+</file>
+
 <file path=ppt/theme/theme1.xml><?xml version="1.0" encoding="utf-8"?>
 <a:theme xmlns:a="http://schemas.openxmlformats.org/drawingml/2006/main" name="Office 主题">
   <a:themeElements>

</xml_diff>